<commit_message>
Here It is ~~
</commit_message>
<xml_diff>
--- a/Paper/HumanDT/그림자료.pptx
+++ b/Paper/HumanDT/그림자료.pptx
@@ -5,13 +5,14 @@
     <p:sldMasterId id="2147483648" r:id="rId1"/>
   </p:sldMasterIdLst>
   <p:notesMasterIdLst>
-    <p:notesMasterId r:id="rId6"/>
+    <p:notesMasterId r:id="rId7"/>
   </p:notesMasterIdLst>
   <p:sldIdLst>
     <p:sldId id="256" r:id="rId2"/>
     <p:sldId id="257" r:id="rId3"/>
     <p:sldId id="258" r:id="rId4"/>
     <p:sldId id="259" r:id="rId5"/>
+    <p:sldId id="260" r:id="rId6"/>
   </p:sldIdLst>
   <p:sldSz cx="12192000" cy="6858000"/>
   <p:notesSz cx="6858000" cy="9144000"/>
@@ -10786,10 +10787,1822 @@
           </a:fontRef>
         </p:style>
       </p:cxnSp>
+      <p:graphicFrame>
+        <p:nvGraphicFramePr>
+          <p:cNvPr id="41" name="표 41">
+            <a:extLst>
+              <a:ext uri="{FF2B5EF4-FFF2-40B4-BE49-F238E27FC236}">
+                <a16:creationId xmlns:a16="http://schemas.microsoft.com/office/drawing/2014/main" id="{C68AD234-7BF2-42AA-A3CE-FCA775C1466D}"/>
+              </a:ext>
+            </a:extLst>
+          </p:cNvPr>
+          <p:cNvGraphicFramePr>
+            <a:graphicFrameLocks noGrp="1"/>
+          </p:cNvGraphicFramePr>
+          <p:nvPr>
+            <p:extLst>
+              <p:ext uri="{D42A27DB-BD31-4B8C-83A1-F6EECF244321}">
+                <p14:modId xmlns:p14="http://schemas.microsoft.com/office/powerpoint/2010/main" val="1234223509"/>
+              </p:ext>
+            </p:extLst>
+          </p:nvPr>
+        </p:nvGraphicFramePr>
+        <p:xfrm>
+          <a:off x="5421298" y="2253745"/>
+          <a:ext cx="3561399" cy="2595880"/>
+        </p:xfrm>
+        <a:graphic>
+          <a:graphicData uri="http://schemas.openxmlformats.org/drawingml/2006/table">
+            <a:tbl>
+              <a:tblPr firstRow="1" bandRow="1">
+                <a:tableStyleId>{5C22544A-7EE6-4342-B048-85BDC9FD1C3A}</a:tableStyleId>
+              </a:tblPr>
+              <a:tblGrid>
+                <a:gridCol w="590868">
+                  <a:extLst>
+                    <a:ext uri="{9D8B030D-6E8A-4147-A177-3AD203B41FA5}">
+                      <a16:colId xmlns:a16="http://schemas.microsoft.com/office/drawing/2014/main" val="3764513942"/>
+                    </a:ext>
+                  </a:extLst>
+                </a:gridCol>
+                <a:gridCol w="335280">
+                  <a:extLst>
+                    <a:ext uri="{9D8B030D-6E8A-4147-A177-3AD203B41FA5}">
+                      <a16:colId xmlns:a16="http://schemas.microsoft.com/office/drawing/2014/main" val="4209409015"/>
+                    </a:ext>
+                  </a:extLst>
+                </a:gridCol>
+                <a:gridCol w="413068">
+                  <a:extLst>
+                    <a:ext uri="{9D8B030D-6E8A-4147-A177-3AD203B41FA5}">
+                      <a16:colId xmlns:a16="http://schemas.microsoft.com/office/drawing/2014/main" val="358267713"/>
+                    </a:ext>
+                  </a:extLst>
+                </a:gridCol>
+                <a:gridCol w="608330">
+                  <a:extLst>
+                    <a:ext uri="{9D8B030D-6E8A-4147-A177-3AD203B41FA5}">
+                      <a16:colId xmlns:a16="http://schemas.microsoft.com/office/drawing/2014/main" val="3616449482"/>
+                    </a:ext>
+                  </a:extLst>
+                </a:gridCol>
+                <a:gridCol w="601980">
+                  <a:extLst>
+                    <a:ext uri="{9D8B030D-6E8A-4147-A177-3AD203B41FA5}">
+                      <a16:colId xmlns:a16="http://schemas.microsoft.com/office/drawing/2014/main" val="2321442705"/>
+                    </a:ext>
+                  </a:extLst>
+                </a:gridCol>
+                <a:gridCol w="405130">
+                  <a:extLst>
+                    <a:ext uri="{9D8B030D-6E8A-4147-A177-3AD203B41FA5}">
+                      <a16:colId xmlns:a16="http://schemas.microsoft.com/office/drawing/2014/main" val="3711879686"/>
+                    </a:ext>
+                  </a:extLst>
+                </a:gridCol>
+                <a:gridCol w="606743">
+                  <a:extLst>
+                    <a:ext uri="{9D8B030D-6E8A-4147-A177-3AD203B41FA5}">
+                      <a16:colId xmlns:a16="http://schemas.microsoft.com/office/drawing/2014/main" val="2790118313"/>
+                    </a:ext>
+                  </a:extLst>
+                </a:gridCol>
+              </a:tblGrid>
+              <a:tr h="370840">
+                <a:tc>
+                  <a:txBody>
+                    <a:bodyPr/>
+                    <a:lstStyle/>
+                    <a:p>
+                      <a:pPr latinLnBrk="1"/>
+                      <a:endParaRPr lang="ko-KR" altLang="en-US" dirty="0"/>
+                    </a:p>
+                  </a:txBody>
+                  <a:tcPr/>
+                </a:tc>
+                <a:tc>
+                  <a:txBody>
+                    <a:bodyPr/>
+                    <a:lstStyle/>
+                    <a:p>
+                      <a:pPr latinLnBrk="1"/>
+                      <a:r>
+                        <a:rPr lang="en-US" altLang="ko-KR" dirty="0"/>
+                        <a:t>I</a:t>
+                      </a:r>
+                      <a:endParaRPr lang="ko-KR" altLang="en-US" dirty="0"/>
+                    </a:p>
+                  </a:txBody>
+                  <a:tcPr/>
+                </a:tc>
+                <a:tc>
+                  <a:txBody>
+                    <a:bodyPr/>
+                    <a:lstStyle/>
+                    <a:p>
+                      <a:pPr latinLnBrk="1"/>
+                      <a:r>
+                        <a:rPr lang="en-US" altLang="ko-KR" dirty="0"/>
+                        <a:t>R</a:t>
+                      </a:r>
+                      <a:endParaRPr lang="ko-KR" altLang="en-US" dirty="0"/>
+                    </a:p>
+                  </a:txBody>
+                  <a:tcPr/>
+                </a:tc>
+                <a:tc>
+                  <a:txBody>
+                    <a:bodyPr/>
+                    <a:lstStyle/>
+                    <a:p>
+                      <a:pPr latinLnBrk="1"/>
+                      <a:r>
+                        <a:rPr lang="en-US" altLang="ko-KR" dirty="0"/>
+                        <a:t>EM</a:t>
+                      </a:r>
+                      <a:endParaRPr lang="ko-KR" altLang="en-US" dirty="0"/>
+                    </a:p>
+                  </a:txBody>
+                  <a:tcPr/>
+                </a:tc>
+                <a:tc>
+                  <a:txBody>
+                    <a:bodyPr/>
+                    <a:lstStyle/>
+                    <a:p>
+                      <a:pPr latinLnBrk="1"/>
+                      <a:r>
+                        <a:rPr lang="en-US" altLang="ko-KR" dirty="0"/>
+                        <a:t>LM</a:t>
+                      </a:r>
+                      <a:endParaRPr lang="ko-KR" altLang="en-US" dirty="0"/>
+                    </a:p>
+                  </a:txBody>
+                  <a:tcPr/>
+                </a:tc>
+                <a:tc>
+                  <a:txBody>
+                    <a:bodyPr/>
+                    <a:lstStyle/>
+                    <a:p>
+                      <a:pPr latinLnBrk="1"/>
+                      <a:r>
+                        <a:rPr lang="en-US" altLang="ko-KR" dirty="0"/>
+                        <a:t>P</a:t>
+                      </a:r>
+                      <a:endParaRPr lang="ko-KR" altLang="en-US" dirty="0"/>
+                    </a:p>
+                  </a:txBody>
+                  <a:tcPr/>
+                </a:tc>
+                <a:tc>
+                  <a:txBody>
+                    <a:bodyPr/>
+                    <a:lstStyle/>
+                    <a:p>
+                      <a:pPr latinLnBrk="1"/>
+                      <a:r>
+                        <a:rPr lang="en-US" altLang="ko-KR" dirty="0"/>
+                        <a:t>NA</a:t>
+                      </a:r>
+                      <a:endParaRPr lang="ko-KR" altLang="en-US" dirty="0"/>
+                    </a:p>
+                  </a:txBody>
+                  <a:tcPr/>
+                </a:tc>
+                <a:extLst>
+                  <a:ext uri="{0D108BD9-81ED-4DB2-BD59-A6C34878D82A}">
+                    <a16:rowId xmlns:a16="http://schemas.microsoft.com/office/drawing/2014/main" val="481461514"/>
+                  </a:ext>
+                </a:extLst>
+              </a:tr>
+              <a:tr h="370840">
+                <a:tc>
+                  <a:txBody>
+                    <a:bodyPr/>
+                    <a:lstStyle/>
+                    <a:p>
+                      <a:pPr latinLnBrk="1"/>
+                      <a:r>
+                        <a:rPr lang="en-US" altLang="ko-KR" dirty="0"/>
+                        <a:t>I</a:t>
+                      </a:r>
+                      <a:endParaRPr lang="ko-KR" altLang="en-US" dirty="0"/>
+                    </a:p>
+                  </a:txBody>
+                  <a:tcPr/>
+                </a:tc>
+                <a:tc>
+                  <a:txBody>
+                    <a:bodyPr/>
+                    <a:lstStyle/>
+                    <a:p>
+                      <a:pPr latinLnBrk="1"/>
+                      <a:r>
+                        <a:rPr lang="en-US" altLang="ko-KR" dirty="0"/>
+                        <a:t>0</a:t>
+                      </a:r>
+                      <a:endParaRPr lang="ko-KR" altLang="en-US" dirty="0"/>
+                    </a:p>
+                  </a:txBody>
+                  <a:tcPr/>
+                </a:tc>
+                <a:tc>
+                  <a:txBody>
+                    <a:bodyPr/>
+                    <a:lstStyle/>
+                    <a:p>
+                      <a:pPr latinLnBrk="1"/>
+                      <a:r>
+                        <a:rPr lang="en-US" altLang="ko-KR" dirty="0"/>
+                        <a:t>1</a:t>
+                      </a:r>
+                      <a:endParaRPr lang="ko-KR" altLang="en-US" dirty="0"/>
+                    </a:p>
+                  </a:txBody>
+                  <a:tcPr/>
+                </a:tc>
+                <a:tc>
+                  <a:txBody>
+                    <a:bodyPr/>
+                    <a:lstStyle/>
+                    <a:p>
+                      <a:pPr latinLnBrk="1"/>
+                      <a:r>
+                        <a:rPr lang="en-US" altLang="ko-KR" dirty="0"/>
+                        <a:t>2</a:t>
+                      </a:r>
+                      <a:endParaRPr lang="ko-KR" altLang="en-US" dirty="0"/>
+                    </a:p>
+                  </a:txBody>
+                  <a:tcPr/>
+                </a:tc>
+                <a:tc>
+                  <a:txBody>
+                    <a:bodyPr/>
+                    <a:lstStyle/>
+                    <a:p>
+                      <a:pPr latinLnBrk="1"/>
+                      <a:r>
+                        <a:rPr lang="en-US" altLang="ko-KR" dirty="0"/>
+                        <a:t>2</a:t>
+                      </a:r>
+                      <a:endParaRPr lang="ko-KR" altLang="en-US" dirty="0"/>
+                    </a:p>
+                  </a:txBody>
+                  <a:tcPr/>
+                </a:tc>
+                <a:tc>
+                  <a:txBody>
+                    <a:bodyPr/>
+                    <a:lstStyle/>
+                    <a:p>
+                      <a:pPr latinLnBrk="1"/>
+                      <a:r>
+                        <a:rPr lang="en-US" altLang="ko-KR" dirty="0"/>
+                        <a:t>2</a:t>
+                      </a:r>
+                      <a:endParaRPr lang="ko-KR" altLang="en-US" dirty="0"/>
+                    </a:p>
+                  </a:txBody>
+                  <a:tcPr/>
+                </a:tc>
+                <a:tc>
+                  <a:txBody>
+                    <a:bodyPr/>
+                    <a:lstStyle/>
+                    <a:p>
+                      <a:pPr latinLnBrk="1"/>
+                      <a:r>
+                        <a:rPr lang="en-US" altLang="ko-KR" dirty="0"/>
+                        <a:t>3</a:t>
+                      </a:r>
+                      <a:endParaRPr lang="ko-KR" altLang="en-US" dirty="0"/>
+                    </a:p>
+                  </a:txBody>
+                  <a:tcPr/>
+                </a:tc>
+                <a:extLst>
+                  <a:ext uri="{0D108BD9-81ED-4DB2-BD59-A6C34878D82A}">
+                    <a16:rowId xmlns:a16="http://schemas.microsoft.com/office/drawing/2014/main" val="3992623442"/>
+                  </a:ext>
+                </a:extLst>
+              </a:tr>
+              <a:tr h="370840">
+                <a:tc>
+                  <a:txBody>
+                    <a:bodyPr/>
+                    <a:lstStyle/>
+                    <a:p>
+                      <a:pPr latinLnBrk="1"/>
+                      <a:r>
+                        <a:rPr lang="en-US" altLang="ko-KR" dirty="0"/>
+                        <a:t>R</a:t>
+                      </a:r>
+                      <a:endParaRPr lang="ko-KR" altLang="en-US" dirty="0"/>
+                    </a:p>
+                  </a:txBody>
+                  <a:tcPr/>
+                </a:tc>
+                <a:tc>
+                  <a:txBody>
+                    <a:bodyPr/>
+                    <a:lstStyle/>
+                    <a:p>
+                      <a:pPr latinLnBrk="1"/>
+                      <a:r>
+                        <a:rPr lang="en-US" altLang="ko-KR" dirty="0"/>
+                        <a:t>2</a:t>
+                      </a:r>
+                      <a:endParaRPr lang="ko-KR" altLang="en-US" dirty="0"/>
+                    </a:p>
+                  </a:txBody>
+                  <a:tcPr/>
+                </a:tc>
+                <a:tc>
+                  <a:txBody>
+                    <a:bodyPr/>
+                    <a:lstStyle/>
+                    <a:p>
+                      <a:pPr latinLnBrk="1"/>
+                      <a:r>
+                        <a:rPr lang="en-US" altLang="ko-KR" dirty="0"/>
+                        <a:t>0</a:t>
+                      </a:r>
+                      <a:endParaRPr lang="ko-KR" altLang="en-US" dirty="0"/>
+                    </a:p>
+                  </a:txBody>
+                  <a:tcPr/>
+                </a:tc>
+                <a:tc>
+                  <a:txBody>
+                    <a:bodyPr/>
+                    <a:lstStyle/>
+                    <a:p>
+                      <a:pPr latinLnBrk="1"/>
+                      <a:r>
+                        <a:rPr lang="en-US" altLang="ko-KR" dirty="0"/>
+                        <a:t>1</a:t>
+                      </a:r>
+                      <a:endParaRPr lang="ko-KR" altLang="en-US" dirty="0"/>
+                    </a:p>
+                  </a:txBody>
+                  <a:tcPr/>
+                </a:tc>
+                <a:tc>
+                  <a:txBody>
+                    <a:bodyPr/>
+                    <a:lstStyle/>
+                    <a:p>
+                      <a:pPr latinLnBrk="1"/>
+                      <a:r>
+                        <a:rPr lang="en-US" altLang="ko-KR" dirty="0"/>
+                        <a:t>1</a:t>
+                      </a:r>
+                      <a:endParaRPr lang="ko-KR" altLang="en-US" dirty="0"/>
+                    </a:p>
+                  </a:txBody>
+                  <a:tcPr/>
+                </a:tc>
+                <a:tc>
+                  <a:txBody>
+                    <a:bodyPr/>
+                    <a:lstStyle/>
+                    <a:p>
+                      <a:pPr latinLnBrk="1"/>
+                      <a:r>
+                        <a:rPr lang="en-US" altLang="ko-KR" dirty="0"/>
+                        <a:t>2</a:t>
+                      </a:r>
+                      <a:endParaRPr lang="ko-KR" altLang="en-US" dirty="0"/>
+                    </a:p>
+                  </a:txBody>
+                  <a:tcPr/>
+                </a:tc>
+                <a:tc>
+                  <a:txBody>
+                    <a:bodyPr/>
+                    <a:lstStyle/>
+                    <a:p>
+                      <a:pPr latinLnBrk="1"/>
+                      <a:r>
+                        <a:rPr lang="en-US" altLang="ko-KR" dirty="0"/>
+                        <a:t>2</a:t>
+                      </a:r>
+                      <a:endParaRPr lang="ko-KR" altLang="en-US" dirty="0"/>
+                    </a:p>
+                  </a:txBody>
+                  <a:tcPr/>
+                </a:tc>
+                <a:extLst>
+                  <a:ext uri="{0D108BD9-81ED-4DB2-BD59-A6C34878D82A}">
+                    <a16:rowId xmlns:a16="http://schemas.microsoft.com/office/drawing/2014/main" val="345506289"/>
+                  </a:ext>
+                </a:extLst>
+              </a:tr>
+              <a:tr h="370840">
+                <a:tc>
+                  <a:txBody>
+                    <a:bodyPr/>
+                    <a:lstStyle/>
+                    <a:p>
+                      <a:pPr latinLnBrk="1"/>
+                      <a:r>
+                        <a:rPr lang="en-US" altLang="ko-KR" dirty="0"/>
+                        <a:t>EM</a:t>
+                      </a:r>
+                      <a:endParaRPr lang="ko-KR" altLang="en-US" dirty="0"/>
+                    </a:p>
+                  </a:txBody>
+                  <a:tcPr/>
+                </a:tc>
+                <a:tc>
+                  <a:txBody>
+                    <a:bodyPr/>
+                    <a:lstStyle/>
+                    <a:p>
+                      <a:pPr latinLnBrk="1"/>
+                      <a:r>
+                        <a:rPr lang="en-US" altLang="ko-KR" dirty="0"/>
+                        <a:t>1</a:t>
+                      </a:r>
+                      <a:endParaRPr lang="ko-KR" altLang="en-US" dirty="0"/>
+                    </a:p>
+                  </a:txBody>
+                  <a:tcPr/>
+                </a:tc>
+                <a:tc>
+                  <a:txBody>
+                    <a:bodyPr/>
+                    <a:lstStyle/>
+                    <a:p>
+                      <a:pPr latinLnBrk="1"/>
+                      <a:r>
+                        <a:rPr lang="en-US" altLang="ko-KR" dirty="0"/>
+                        <a:t>2</a:t>
+                      </a:r>
+                      <a:endParaRPr lang="ko-KR" altLang="en-US" dirty="0"/>
+                    </a:p>
+                  </a:txBody>
+                  <a:tcPr/>
+                </a:tc>
+                <a:tc>
+                  <a:txBody>
+                    <a:bodyPr/>
+                    <a:lstStyle/>
+                    <a:p>
+                      <a:pPr latinLnBrk="1"/>
+                      <a:r>
+                        <a:rPr lang="en-US" altLang="ko-KR" dirty="0"/>
+                        <a:t>0</a:t>
+                      </a:r>
+                      <a:endParaRPr lang="ko-KR" altLang="en-US" dirty="0"/>
+                    </a:p>
+                  </a:txBody>
+                  <a:tcPr/>
+                </a:tc>
+                <a:tc>
+                  <a:txBody>
+                    <a:bodyPr/>
+                    <a:lstStyle/>
+                    <a:p>
+                      <a:pPr latinLnBrk="1"/>
+                      <a:r>
+                        <a:rPr lang="en-US" altLang="ko-KR" dirty="0"/>
+                        <a:t>1</a:t>
+                      </a:r>
+                      <a:endParaRPr lang="ko-KR" altLang="en-US" dirty="0"/>
+                    </a:p>
+                  </a:txBody>
+                  <a:tcPr/>
+                </a:tc>
+                <a:tc>
+                  <a:txBody>
+                    <a:bodyPr/>
+                    <a:lstStyle/>
+                    <a:p>
+                      <a:pPr latinLnBrk="1"/>
+                      <a:r>
+                        <a:rPr lang="en-US" altLang="ko-KR" dirty="0"/>
+                        <a:t>2</a:t>
+                      </a:r>
+                      <a:endParaRPr lang="ko-KR" altLang="en-US" dirty="0"/>
+                    </a:p>
+                  </a:txBody>
+                  <a:tcPr/>
+                </a:tc>
+                <a:tc>
+                  <a:txBody>
+                    <a:bodyPr/>
+                    <a:lstStyle/>
+                    <a:p>
+                      <a:pPr latinLnBrk="1"/>
+                      <a:r>
+                        <a:rPr lang="en-US" altLang="ko-KR" dirty="0"/>
+                        <a:t>1</a:t>
+                      </a:r>
+                      <a:endParaRPr lang="ko-KR" altLang="en-US" dirty="0"/>
+                    </a:p>
+                  </a:txBody>
+                  <a:tcPr/>
+                </a:tc>
+                <a:extLst>
+                  <a:ext uri="{0D108BD9-81ED-4DB2-BD59-A6C34878D82A}">
+                    <a16:rowId xmlns:a16="http://schemas.microsoft.com/office/drawing/2014/main" val="2479322746"/>
+                  </a:ext>
+                </a:extLst>
+              </a:tr>
+              <a:tr h="370840">
+                <a:tc>
+                  <a:txBody>
+                    <a:bodyPr/>
+                    <a:lstStyle/>
+                    <a:p>
+                      <a:pPr latinLnBrk="1"/>
+                      <a:r>
+                        <a:rPr lang="en-US" altLang="ko-KR" dirty="0"/>
+                        <a:t>LM</a:t>
+                      </a:r>
+                      <a:endParaRPr lang="ko-KR" altLang="en-US" dirty="0"/>
+                    </a:p>
+                  </a:txBody>
+                  <a:tcPr/>
+                </a:tc>
+                <a:tc>
+                  <a:txBody>
+                    <a:bodyPr/>
+                    <a:lstStyle/>
+                    <a:p>
+                      <a:pPr latinLnBrk="1"/>
+                      <a:r>
+                        <a:rPr lang="en-US" altLang="ko-KR" dirty="0"/>
+                        <a:t>1</a:t>
+                      </a:r>
+                      <a:endParaRPr lang="ko-KR" altLang="en-US" dirty="0"/>
+                    </a:p>
+                  </a:txBody>
+                  <a:tcPr/>
+                </a:tc>
+                <a:tc>
+                  <a:txBody>
+                    <a:bodyPr/>
+                    <a:lstStyle/>
+                    <a:p>
+                      <a:pPr latinLnBrk="1"/>
+                      <a:r>
+                        <a:rPr lang="en-US" altLang="ko-KR" dirty="0"/>
+                        <a:t>2</a:t>
+                      </a:r>
+                      <a:endParaRPr lang="ko-KR" altLang="en-US" dirty="0"/>
+                    </a:p>
+                  </a:txBody>
+                  <a:tcPr/>
+                </a:tc>
+                <a:tc>
+                  <a:txBody>
+                    <a:bodyPr/>
+                    <a:lstStyle/>
+                    <a:p>
+                      <a:pPr latinLnBrk="1"/>
+                      <a:r>
+                        <a:rPr lang="en-US" altLang="ko-KR" dirty="0"/>
+                        <a:t>2</a:t>
+                      </a:r>
+                      <a:endParaRPr lang="ko-KR" altLang="en-US" dirty="0"/>
+                    </a:p>
+                  </a:txBody>
+                  <a:tcPr/>
+                </a:tc>
+                <a:tc>
+                  <a:txBody>
+                    <a:bodyPr/>
+                    <a:lstStyle/>
+                    <a:p>
+                      <a:pPr latinLnBrk="1"/>
+                      <a:r>
+                        <a:rPr lang="en-US" altLang="ko-KR" dirty="0"/>
+                        <a:t>0</a:t>
+                      </a:r>
+                      <a:endParaRPr lang="ko-KR" altLang="en-US" dirty="0"/>
+                    </a:p>
+                  </a:txBody>
+                  <a:tcPr/>
+                </a:tc>
+                <a:tc>
+                  <a:txBody>
+                    <a:bodyPr/>
+                    <a:lstStyle/>
+                    <a:p>
+                      <a:pPr latinLnBrk="1"/>
+                      <a:r>
+                        <a:rPr lang="en-US" altLang="ko-KR" dirty="0"/>
+                        <a:t>1</a:t>
+                      </a:r>
+                      <a:endParaRPr lang="ko-KR" altLang="en-US" dirty="0"/>
+                    </a:p>
+                  </a:txBody>
+                  <a:tcPr/>
+                </a:tc>
+                <a:tc>
+                  <a:txBody>
+                    <a:bodyPr/>
+                    <a:lstStyle/>
+                    <a:p>
+                      <a:pPr latinLnBrk="1"/>
+                      <a:r>
+                        <a:rPr lang="en-US" altLang="ko-KR" dirty="0"/>
+                        <a:t>1</a:t>
+                      </a:r>
+                      <a:endParaRPr lang="ko-KR" altLang="en-US" dirty="0"/>
+                    </a:p>
+                  </a:txBody>
+                  <a:tcPr/>
+                </a:tc>
+                <a:extLst>
+                  <a:ext uri="{0D108BD9-81ED-4DB2-BD59-A6C34878D82A}">
+                    <a16:rowId xmlns:a16="http://schemas.microsoft.com/office/drawing/2014/main" val="1594329217"/>
+                  </a:ext>
+                </a:extLst>
+              </a:tr>
+              <a:tr h="370840">
+                <a:tc>
+                  <a:txBody>
+                    <a:bodyPr/>
+                    <a:lstStyle/>
+                    <a:p>
+                      <a:pPr latinLnBrk="1"/>
+                      <a:r>
+                        <a:rPr lang="en-US" altLang="ko-KR" dirty="0"/>
+                        <a:t>P</a:t>
+                      </a:r>
+                      <a:endParaRPr lang="ko-KR" altLang="en-US" dirty="0"/>
+                    </a:p>
+                  </a:txBody>
+                  <a:tcPr/>
+                </a:tc>
+                <a:tc>
+                  <a:txBody>
+                    <a:bodyPr/>
+                    <a:lstStyle/>
+                    <a:p>
+                      <a:pPr latinLnBrk="1"/>
+                      <a:r>
+                        <a:rPr lang="en-US" altLang="ko-KR" dirty="0"/>
+                        <a:t>2</a:t>
+                      </a:r>
+                      <a:endParaRPr lang="ko-KR" altLang="en-US" dirty="0"/>
+                    </a:p>
+                  </a:txBody>
+                  <a:tcPr/>
+                </a:tc>
+                <a:tc>
+                  <a:txBody>
+                    <a:bodyPr/>
+                    <a:lstStyle/>
+                    <a:p>
+                      <a:pPr latinLnBrk="1"/>
+                      <a:r>
+                        <a:rPr lang="en-US" altLang="ko-KR" dirty="0"/>
+                        <a:t>3</a:t>
+                      </a:r>
+                      <a:endParaRPr lang="ko-KR" altLang="en-US" dirty="0"/>
+                    </a:p>
+                  </a:txBody>
+                  <a:tcPr/>
+                </a:tc>
+                <a:tc>
+                  <a:txBody>
+                    <a:bodyPr/>
+                    <a:lstStyle/>
+                    <a:p>
+                      <a:pPr latinLnBrk="1"/>
+                      <a:r>
+                        <a:rPr lang="en-US" altLang="ko-KR" dirty="0"/>
+                        <a:t>1</a:t>
+                      </a:r>
+                      <a:endParaRPr lang="ko-KR" altLang="en-US" dirty="0"/>
+                    </a:p>
+                  </a:txBody>
+                  <a:tcPr/>
+                </a:tc>
+                <a:tc>
+                  <a:txBody>
+                    <a:bodyPr/>
+                    <a:lstStyle/>
+                    <a:p>
+                      <a:pPr latinLnBrk="1"/>
+                      <a:r>
+                        <a:rPr lang="en-US" altLang="ko-KR" dirty="0"/>
+                        <a:t>2</a:t>
+                      </a:r>
+                      <a:endParaRPr lang="ko-KR" altLang="en-US" dirty="0"/>
+                    </a:p>
+                  </a:txBody>
+                  <a:tcPr/>
+                </a:tc>
+                <a:tc>
+                  <a:txBody>
+                    <a:bodyPr/>
+                    <a:lstStyle/>
+                    <a:p>
+                      <a:pPr latinLnBrk="1"/>
+                      <a:r>
+                        <a:rPr lang="en-US" altLang="ko-KR" dirty="0"/>
+                        <a:t>0</a:t>
+                      </a:r>
+                      <a:endParaRPr lang="ko-KR" altLang="en-US" dirty="0"/>
+                    </a:p>
+                  </a:txBody>
+                  <a:tcPr/>
+                </a:tc>
+                <a:tc>
+                  <a:txBody>
+                    <a:bodyPr/>
+                    <a:lstStyle/>
+                    <a:p>
+                      <a:pPr latinLnBrk="1"/>
+                      <a:r>
+                        <a:rPr lang="en-US" altLang="ko-KR" dirty="0"/>
+                        <a:t>2</a:t>
+                      </a:r>
+                      <a:endParaRPr lang="ko-KR" altLang="en-US" dirty="0"/>
+                    </a:p>
+                  </a:txBody>
+                  <a:tcPr/>
+                </a:tc>
+                <a:extLst>
+                  <a:ext uri="{0D108BD9-81ED-4DB2-BD59-A6C34878D82A}">
+                    <a16:rowId xmlns:a16="http://schemas.microsoft.com/office/drawing/2014/main" val="1215727969"/>
+                  </a:ext>
+                </a:extLst>
+              </a:tr>
+              <a:tr h="370840">
+                <a:tc>
+                  <a:txBody>
+                    <a:bodyPr/>
+                    <a:lstStyle/>
+                    <a:p>
+                      <a:pPr latinLnBrk="1"/>
+                      <a:r>
+                        <a:rPr lang="en-US" altLang="ko-KR" dirty="0"/>
+                        <a:t>NA</a:t>
+                      </a:r>
+                      <a:endParaRPr lang="ko-KR" altLang="en-US" dirty="0"/>
+                    </a:p>
+                  </a:txBody>
+                  <a:tcPr/>
+                </a:tc>
+                <a:tc>
+                  <a:txBody>
+                    <a:bodyPr/>
+                    <a:lstStyle/>
+                    <a:p>
+                      <a:pPr latinLnBrk="1"/>
+                      <a:r>
+                        <a:rPr lang="en-US" altLang="ko-KR" dirty="0"/>
+                        <a:t>2</a:t>
+                      </a:r>
+                      <a:endParaRPr lang="ko-KR" altLang="en-US" dirty="0"/>
+                    </a:p>
+                  </a:txBody>
+                  <a:tcPr/>
+                </a:tc>
+                <a:tc>
+                  <a:txBody>
+                    <a:bodyPr/>
+                    <a:lstStyle/>
+                    <a:p>
+                      <a:pPr latinLnBrk="1"/>
+                      <a:r>
+                        <a:rPr lang="en-US" altLang="ko-KR" dirty="0"/>
+                        <a:t>3</a:t>
+                      </a:r>
+                      <a:endParaRPr lang="ko-KR" altLang="en-US" dirty="0"/>
+                    </a:p>
+                  </a:txBody>
+                  <a:tcPr/>
+                </a:tc>
+                <a:tc>
+                  <a:txBody>
+                    <a:bodyPr/>
+                    <a:lstStyle/>
+                    <a:p>
+                      <a:pPr latinLnBrk="1"/>
+                      <a:r>
+                        <a:rPr lang="en-US" altLang="ko-KR" dirty="0"/>
+                        <a:t>1</a:t>
+                      </a:r>
+                      <a:endParaRPr lang="ko-KR" altLang="en-US" dirty="0"/>
+                    </a:p>
+                  </a:txBody>
+                  <a:tcPr/>
+                </a:tc>
+                <a:tc>
+                  <a:txBody>
+                    <a:bodyPr/>
+                    <a:lstStyle/>
+                    <a:p>
+                      <a:pPr latinLnBrk="1"/>
+                      <a:r>
+                        <a:rPr lang="en-US" altLang="ko-KR" dirty="0"/>
+                        <a:t>1</a:t>
+                      </a:r>
+                      <a:endParaRPr lang="ko-KR" altLang="en-US" dirty="0"/>
+                    </a:p>
+                  </a:txBody>
+                  <a:tcPr/>
+                </a:tc>
+                <a:tc>
+                  <a:txBody>
+                    <a:bodyPr/>
+                    <a:lstStyle/>
+                    <a:p>
+                      <a:pPr latinLnBrk="1"/>
+                      <a:r>
+                        <a:rPr lang="en-US" altLang="ko-KR" dirty="0"/>
+                        <a:t>2</a:t>
+                      </a:r>
+                      <a:endParaRPr lang="ko-KR" altLang="en-US" dirty="0"/>
+                    </a:p>
+                  </a:txBody>
+                  <a:tcPr/>
+                </a:tc>
+                <a:tc>
+                  <a:txBody>
+                    <a:bodyPr/>
+                    <a:lstStyle/>
+                    <a:p>
+                      <a:pPr latinLnBrk="1"/>
+                      <a:r>
+                        <a:rPr lang="en-US" altLang="ko-KR" dirty="0"/>
+                        <a:t>0</a:t>
+                      </a:r>
+                      <a:endParaRPr lang="ko-KR" altLang="en-US" dirty="0"/>
+                    </a:p>
+                  </a:txBody>
+                  <a:tcPr/>
+                </a:tc>
+                <a:extLst>
+                  <a:ext uri="{0D108BD9-81ED-4DB2-BD59-A6C34878D82A}">
+                    <a16:rowId xmlns:a16="http://schemas.microsoft.com/office/drawing/2014/main" val="646486996"/>
+                  </a:ext>
+                </a:extLst>
+              </a:tr>
+            </a:tbl>
+          </a:graphicData>
+        </a:graphic>
+      </p:graphicFrame>
     </p:spTree>
     <p:extLst>
       <p:ext uri="{BB962C8B-B14F-4D97-AF65-F5344CB8AC3E}">
         <p14:creationId xmlns:p14="http://schemas.microsoft.com/office/powerpoint/2010/main" val="3803066793"/>
+      </p:ext>
+    </p:extLst>
+  </p:cSld>
+  <p:clrMapOvr>
+    <a:masterClrMapping/>
+  </p:clrMapOvr>
+</p:sld>
+</file>
+
+<file path=ppt/slides/slide5.xml><?xml version="1.0" encoding="utf-8"?>
+<p:sld xmlns:a="http://schemas.openxmlformats.org/drawingml/2006/main" xmlns:r="http://schemas.openxmlformats.org/officeDocument/2006/relationships" xmlns:p="http://schemas.openxmlformats.org/presentationml/2006/main">
+  <p:cSld>
+    <p:spTree>
+      <p:nvGrpSpPr>
+        <p:cNvPr id="1" name=""/>
+        <p:cNvGrpSpPr/>
+        <p:nvPr/>
+      </p:nvGrpSpPr>
+      <p:grpSpPr>
+        <a:xfrm>
+          <a:off x="0" y="0"/>
+          <a:ext cx="0" cy="0"/>
+          <a:chOff x="0" y="0"/>
+          <a:chExt cx="0" cy="0"/>
+        </a:xfrm>
+      </p:grpSpPr>
+      <p:sp>
+        <p:nvSpPr>
+          <p:cNvPr id="4" name="직사각형 3">
+            <a:extLst>
+              <a:ext uri="{FF2B5EF4-FFF2-40B4-BE49-F238E27FC236}">
+                <a16:creationId xmlns:a16="http://schemas.microsoft.com/office/drawing/2014/main" id="{428D9905-68D2-45EF-AD3E-93776D172CCB}"/>
+              </a:ext>
+            </a:extLst>
+          </p:cNvPr>
+          <p:cNvSpPr/>
+          <p:nvPr/>
+        </p:nvSpPr>
+        <p:spPr>
+          <a:xfrm>
+            <a:off x="697117" y="706170"/>
+            <a:ext cx="2444436" cy="2209046"/>
+          </a:xfrm>
+          <a:prstGeom prst="rect">
+            <a:avLst/>
+          </a:prstGeom>
+          <a:noFill/>
+          <a:ln>
+            <a:solidFill>
+              <a:schemeClr val="tx1"/>
+            </a:solidFill>
+          </a:ln>
+        </p:spPr>
+        <p:style>
+          <a:lnRef idx="2">
+            <a:schemeClr val="accent1">
+              <a:shade val="50000"/>
+            </a:schemeClr>
+          </a:lnRef>
+          <a:fillRef idx="1">
+            <a:schemeClr val="accent1"/>
+          </a:fillRef>
+          <a:effectRef idx="0">
+            <a:schemeClr val="accent1"/>
+          </a:effectRef>
+          <a:fontRef idx="minor">
+            <a:schemeClr val="lt1"/>
+          </a:fontRef>
+        </p:style>
+        <p:txBody>
+          <a:bodyPr rtlCol="0" anchor="ctr"/>
+          <a:lstStyle/>
+          <a:p>
+            <a:pPr algn="ctr"/>
+            <a:endParaRPr lang="ko-KR" altLang="en-US"/>
+          </a:p>
+        </p:txBody>
+      </p:sp>
+      <p:sp>
+        <p:nvSpPr>
+          <p:cNvPr id="5" name="TextBox 4">
+            <a:extLst>
+              <a:ext uri="{FF2B5EF4-FFF2-40B4-BE49-F238E27FC236}">
+                <a16:creationId xmlns:a16="http://schemas.microsoft.com/office/drawing/2014/main" id="{06DFF695-F532-43C1-B3E5-BF08ACE4B46A}"/>
+              </a:ext>
+            </a:extLst>
+          </p:cNvPr>
+          <p:cNvSpPr txBox="1"/>
+          <p:nvPr/>
+        </p:nvSpPr>
+        <p:spPr>
+          <a:xfrm>
+            <a:off x="455351" y="186526"/>
+            <a:ext cx="1007648" cy="369332"/>
+          </a:xfrm>
+          <a:prstGeom prst="rect">
+            <a:avLst/>
+          </a:prstGeom>
+          <a:noFill/>
+        </p:spPr>
+        <p:txBody>
+          <a:bodyPr wrap="none" rtlCol="0">
+            <a:spAutoFit/>
+          </a:bodyPr>
+          <a:lstStyle/>
+          <a:p>
+            <a:r>
+              <a:rPr lang="en-US" altLang="ko-KR" b="1" dirty="0">
+                <a:latin typeface="Times New Roman" panose="02020603050405020304" pitchFamily="18" charset="0"/>
+                <a:cs typeface="Times New Roman" panose="02020603050405020304" pitchFamily="18" charset="0"/>
+              </a:rPr>
+              <a:t>Figure 1</a:t>
+            </a:r>
+            <a:endParaRPr lang="ko-KR" altLang="en-US" b="1" dirty="0">
+              <a:latin typeface="Times New Roman" panose="02020603050405020304" pitchFamily="18" charset="0"/>
+              <a:cs typeface="Times New Roman" panose="02020603050405020304" pitchFamily="18" charset="0"/>
+            </a:endParaRPr>
+          </a:p>
+        </p:txBody>
+      </p:sp>
+      <p:sp>
+        <p:nvSpPr>
+          <p:cNvPr id="6" name="TextBox 5">
+            <a:extLst>
+              <a:ext uri="{FF2B5EF4-FFF2-40B4-BE49-F238E27FC236}">
+                <a16:creationId xmlns:a16="http://schemas.microsoft.com/office/drawing/2014/main" id="{247BDEC8-27EB-4F2A-A3FD-2A52C4CA7099}"/>
+              </a:ext>
+            </a:extLst>
+          </p:cNvPr>
+          <p:cNvSpPr txBox="1"/>
+          <p:nvPr/>
+        </p:nvSpPr>
+        <p:spPr>
+          <a:xfrm>
+            <a:off x="455351" y="3600613"/>
+            <a:ext cx="1007648" cy="369332"/>
+          </a:xfrm>
+          <a:prstGeom prst="rect">
+            <a:avLst/>
+          </a:prstGeom>
+          <a:noFill/>
+        </p:spPr>
+        <p:txBody>
+          <a:bodyPr wrap="none" rtlCol="0">
+            <a:spAutoFit/>
+          </a:bodyPr>
+          <a:lstStyle/>
+          <a:p>
+            <a:r>
+              <a:rPr lang="en-US" altLang="ko-KR" b="1" dirty="0">
+                <a:latin typeface="Times New Roman" panose="02020603050405020304" pitchFamily="18" charset="0"/>
+                <a:cs typeface="Times New Roman" panose="02020603050405020304" pitchFamily="18" charset="0"/>
+              </a:rPr>
+              <a:t>Figure 2</a:t>
+            </a:r>
+            <a:endParaRPr lang="ko-KR" altLang="en-US" b="1" dirty="0">
+              <a:latin typeface="Times New Roman" panose="02020603050405020304" pitchFamily="18" charset="0"/>
+              <a:cs typeface="Times New Roman" panose="02020603050405020304" pitchFamily="18" charset="0"/>
+            </a:endParaRPr>
+          </a:p>
+        </p:txBody>
+      </p:sp>
+      <p:sp>
+        <p:nvSpPr>
+          <p:cNvPr id="7" name="직사각형 6">
+            <a:extLst>
+              <a:ext uri="{FF2B5EF4-FFF2-40B4-BE49-F238E27FC236}">
+                <a16:creationId xmlns:a16="http://schemas.microsoft.com/office/drawing/2014/main" id="{63BE35BC-0091-4AD6-BE8C-0C288336523F}"/>
+              </a:ext>
+            </a:extLst>
+          </p:cNvPr>
+          <p:cNvSpPr/>
+          <p:nvPr/>
+        </p:nvSpPr>
+        <p:spPr>
+          <a:xfrm>
+            <a:off x="3571592" y="706170"/>
+            <a:ext cx="2444436" cy="2209046"/>
+          </a:xfrm>
+          <a:prstGeom prst="rect">
+            <a:avLst/>
+          </a:prstGeom>
+          <a:noFill/>
+          <a:ln>
+            <a:solidFill>
+              <a:schemeClr val="tx1"/>
+            </a:solidFill>
+          </a:ln>
+        </p:spPr>
+        <p:style>
+          <a:lnRef idx="2">
+            <a:schemeClr val="accent1">
+              <a:shade val="50000"/>
+            </a:schemeClr>
+          </a:lnRef>
+          <a:fillRef idx="1">
+            <a:schemeClr val="accent1"/>
+          </a:fillRef>
+          <a:effectRef idx="0">
+            <a:schemeClr val="accent1"/>
+          </a:effectRef>
+          <a:fontRef idx="minor">
+            <a:schemeClr val="lt1"/>
+          </a:fontRef>
+        </p:style>
+        <p:txBody>
+          <a:bodyPr rtlCol="0" anchor="ctr"/>
+          <a:lstStyle/>
+          <a:p>
+            <a:pPr algn="ctr"/>
+            <a:endParaRPr lang="ko-KR" altLang="en-US"/>
+          </a:p>
+        </p:txBody>
+      </p:sp>
+      <p:sp>
+        <p:nvSpPr>
+          <p:cNvPr id="8" name="직사각형 7">
+            <a:extLst>
+              <a:ext uri="{FF2B5EF4-FFF2-40B4-BE49-F238E27FC236}">
+                <a16:creationId xmlns:a16="http://schemas.microsoft.com/office/drawing/2014/main" id="{443CAC8C-D024-4C08-B43E-F7998AC71E45}"/>
+              </a:ext>
+            </a:extLst>
+          </p:cNvPr>
+          <p:cNvSpPr/>
+          <p:nvPr/>
+        </p:nvSpPr>
+        <p:spPr>
+          <a:xfrm>
+            <a:off x="6446067" y="706170"/>
+            <a:ext cx="2444436" cy="2209046"/>
+          </a:xfrm>
+          <a:prstGeom prst="rect">
+            <a:avLst/>
+          </a:prstGeom>
+          <a:noFill/>
+          <a:ln>
+            <a:solidFill>
+              <a:schemeClr val="tx1"/>
+            </a:solidFill>
+          </a:ln>
+        </p:spPr>
+        <p:style>
+          <a:lnRef idx="2">
+            <a:schemeClr val="accent1">
+              <a:shade val="50000"/>
+            </a:schemeClr>
+          </a:lnRef>
+          <a:fillRef idx="1">
+            <a:schemeClr val="accent1"/>
+          </a:fillRef>
+          <a:effectRef idx="0">
+            <a:schemeClr val="accent1"/>
+          </a:effectRef>
+          <a:fontRef idx="minor">
+            <a:schemeClr val="lt1"/>
+          </a:fontRef>
+        </p:style>
+        <p:txBody>
+          <a:bodyPr rtlCol="0" anchor="ctr"/>
+          <a:lstStyle/>
+          <a:p>
+            <a:pPr algn="ctr"/>
+            <a:endParaRPr lang="ko-KR" altLang="en-US"/>
+          </a:p>
+        </p:txBody>
+      </p:sp>
+      <p:sp>
+        <p:nvSpPr>
+          <p:cNvPr id="9" name="직사각형 8">
+            <a:extLst>
+              <a:ext uri="{FF2B5EF4-FFF2-40B4-BE49-F238E27FC236}">
+                <a16:creationId xmlns:a16="http://schemas.microsoft.com/office/drawing/2014/main" id="{FF0B236F-3F9F-42C7-815B-B7DFD30626B8}"/>
+              </a:ext>
+            </a:extLst>
+          </p:cNvPr>
+          <p:cNvSpPr/>
+          <p:nvPr/>
+        </p:nvSpPr>
+        <p:spPr>
+          <a:xfrm>
+            <a:off x="9320541" y="706170"/>
+            <a:ext cx="2444436" cy="2209046"/>
+          </a:xfrm>
+          <a:prstGeom prst="rect">
+            <a:avLst/>
+          </a:prstGeom>
+          <a:noFill/>
+          <a:ln>
+            <a:solidFill>
+              <a:schemeClr val="tx1"/>
+            </a:solidFill>
+          </a:ln>
+        </p:spPr>
+        <p:style>
+          <a:lnRef idx="2">
+            <a:schemeClr val="accent1">
+              <a:shade val="50000"/>
+            </a:schemeClr>
+          </a:lnRef>
+          <a:fillRef idx="1">
+            <a:schemeClr val="accent1"/>
+          </a:fillRef>
+          <a:effectRef idx="0">
+            <a:schemeClr val="accent1"/>
+          </a:effectRef>
+          <a:fontRef idx="minor">
+            <a:schemeClr val="lt1"/>
+          </a:fontRef>
+        </p:style>
+        <p:txBody>
+          <a:bodyPr rtlCol="0" anchor="ctr"/>
+          <a:lstStyle/>
+          <a:p>
+            <a:pPr algn="ctr"/>
+            <a:endParaRPr lang="ko-KR" altLang="en-US"/>
+          </a:p>
+        </p:txBody>
+      </p:sp>
+      <p:sp>
+        <p:nvSpPr>
+          <p:cNvPr id="10" name="사각형: 잘린 위쪽 모서리 9">
+            <a:extLst>
+              <a:ext uri="{FF2B5EF4-FFF2-40B4-BE49-F238E27FC236}">
+                <a16:creationId xmlns:a16="http://schemas.microsoft.com/office/drawing/2014/main" id="{169A1EDF-527A-4071-829F-238372A94680}"/>
+              </a:ext>
+            </a:extLst>
+          </p:cNvPr>
+          <p:cNvSpPr/>
+          <p:nvPr/>
+        </p:nvSpPr>
+        <p:spPr>
+          <a:xfrm>
+            <a:off x="1919335" y="2254313"/>
+            <a:ext cx="796705" cy="398352"/>
+          </a:xfrm>
+          <a:prstGeom prst="snip2SameRect">
+            <a:avLst/>
+          </a:prstGeom>
+        </p:spPr>
+        <p:style>
+          <a:lnRef idx="2">
+            <a:schemeClr val="accent4">
+              <a:shade val="50000"/>
+            </a:schemeClr>
+          </a:lnRef>
+          <a:fillRef idx="1">
+            <a:schemeClr val="accent4"/>
+          </a:fillRef>
+          <a:effectRef idx="0">
+            <a:schemeClr val="accent4"/>
+          </a:effectRef>
+          <a:fontRef idx="minor">
+            <a:schemeClr val="lt1"/>
+          </a:fontRef>
+        </p:style>
+        <p:txBody>
+          <a:bodyPr rtlCol="0" anchor="ctr"/>
+          <a:lstStyle/>
+          <a:p>
+            <a:pPr algn="ctr"/>
+            <a:endParaRPr lang="ko-KR" altLang="en-US"/>
+          </a:p>
+        </p:txBody>
+      </p:sp>
+      <p:sp>
+        <p:nvSpPr>
+          <p:cNvPr id="11" name="TextBox 10">
+            <a:extLst>
+              <a:ext uri="{FF2B5EF4-FFF2-40B4-BE49-F238E27FC236}">
+                <a16:creationId xmlns:a16="http://schemas.microsoft.com/office/drawing/2014/main" id="{D9741F37-BF28-48CE-AE0C-9E5D8104283A}"/>
+              </a:ext>
+            </a:extLst>
+          </p:cNvPr>
+          <p:cNvSpPr txBox="1"/>
+          <p:nvPr/>
+        </p:nvSpPr>
+        <p:spPr>
+          <a:xfrm>
+            <a:off x="1403558" y="1884981"/>
+            <a:ext cx="1828257" cy="369332"/>
+          </a:xfrm>
+          <a:prstGeom prst="rect">
+            <a:avLst/>
+          </a:prstGeom>
+          <a:noFill/>
+        </p:spPr>
+        <p:txBody>
+          <a:bodyPr wrap="none" rtlCol="0">
+            <a:spAutoFit/>
+          </a:bodyPr>
+          <a:lstStyle/>
+          <a:p>
+            <a:r>
+              <a:rPr lang="en-US" altLang="ko-KR" b="1" dirty="0">
+                <a:latin typeface="Times New Roman" panose="02020603050405020304" pitchFamily="18" charset="0"/>
+                <a:cs typeface="Times New Roman" panose="02020603050405020304" pitchFamily="18" charset="0"/>
+              </a:rPr>
+              <a:t>Tracking anchor</a:t>
+            </a:r>
+            <a:endParaRPr lang="ko-KR" altLang="en-US" b="1" dirty="0">
+              <a:latin typeface="Times New Roman" panose="02020603050405020304" pitchFamily="18" charset="0"/>
+              <a:cs typeface="Times New Roman" panose="02020603050405020304" pitchFamily="18" charset="0"/>
+            </a:endParaRPr>
+          </a:p>
+        </p:txBody>
+      </p:sp>
+      <p:sp>
+        <p:nvSpPr>
+          <p:cNvPr id="12" name="사각형: 잘린 위쪽 모서리 11">
+            <a:extLst>
+              <a:ext uri="{FF2B5EF4-FFF2-40B4-BE49-F238E27FC236}">
+                <a16:creationId xmlns:a16="http://schemas.microsoft.com/office/drawing/2014/main" id="{D993A086-5200-4470-A2AE-87382EAE87F5}"/>
+              </a:ext>
+            </a:extLst>
+          </p:cNvPr>
+          <p:cNvSpPr/>
+          <p:nvPr/>
+        </p:nvSpPr>
+        <p:spPr>
+          <a:xfrm>
+            <a:off x="3820698" y="2254313"/>
+            <a:ext cx="796705" cy="398352"/>
+          </a:xfrm>
+          <a:prstGeom prst="snip2SameRect">
+            <a:avLst/>
+          </a:prstGeom>
+        </p:spPr>
+        <p:style>
+          <a:lnRef idx="2">
+            <a:schemeClr val="accent4">
+              <a:shade val="50000"/>
+            </a:schemeClr>
+          </a:lnRef>
+          <a:fillRef idx="1">
+            <a:schemeClr val="accent4"/>
+          </a:fillRef>
+          <a:effectRef idx="0">
+            <a:schemeClr val="accent4"/>
+          </a:effectRef>
+          <a:fontRef idx="minor">
+            <a:schemeClr val="lt1"/>
+          </a:fontRef>
+        </p:style>
+        <p:txBody>
+          <a:bodyPr rtlCol="0" anchor="ctr"/>
+          <a:lstStyle/>
+          <a:p>
+            <a:pPr algn="ctr"/>
+            <a:endParaRPr lang="ko-KR" altLang="en-US"/>
+          </a:p>
+        </p:txBody>
+      </p:sp>
+      <p:sp>
+        <p:nvSpPr>
+          <p:cNvPr id="13" name="사각형: 잘린 위쪽 모서리 12">
+            <a:extLst>
+              <a:ext uri="{FF2B5EF4-FFF2-40B4-BE49-F238E27FC236}">
+                <a16:creationId xmlns:a16="http://schemas.microsoft.com/office/drawing/2014/main" id="{0CC000EA-F6E9-4BBE-A99D-E6192533BCF5}"/>
+              </a:ext>
+            </a:extLst>
+          </p:cNvPr>
+          <p:cNvSpPr/>
+          <p:nvPr/>
+        </p:nvSpPr>
+        <p:spPr>
+          <a:xfrm>
+            <a:off x="5140995" y="1698455"/>
+            <a:ext cx="796705" cy="398352"/>
+          </a:xfrm>
+          <a:prstGeom prst="snip2SameRect">
+            <a:avLst/>
+          </a:prstGeom>
+        </p:spPr>
+        <p:style>
+          <a:lnRef idx="2">
+            <a:schemeClr val="accent4">
+              <a:shade val="50000"/>
+            </a:schemeClr>
+          </a:lnRef>
+          <a:fillRef idx="1">
+            <a:schemeClr val="accent4"/>
+          </a:fillRef>
+          <a:effectRef idx="0">
+            <a:schemeClr val="accent4"/>
+          </a:effectRef>
+          <a:fontRef idx="minor">
+            <a:schemeClr val="lt1"/>
+          </a:fontRef>
+        </p:style>
+        <p:txBody>
+          <a:bodyPr rtlCol="0" anchor="ctr"/>
+          <a:lstStyle/>
+          <a:p>
+            <a:pPr algn="ctr"/>
+            <a:endParaRPr lang="ko-KR" altLang="en-US"/>
+          </a:p>
+        </p:txBody>
+      </p:sp>
+      <p:sp>
+        <p:nvSpPr>
+          <p:cNvPr id="14" name="사각형: 잘린 위쪽 모서리 13">
+            <a:extLst>
+              <a:ext uri="{FF2B5EF4-FFF2-40B4-BE49-F238E27FC236}">
+                <a16:creationId xmlns:a16="http://schemas.microsoft.com/office/drawing/2014/main" id="{38CEDC91-566A-4892-A397-DC94EF96D4A3}"/>
+              </a:ext>
+            </a:extLst>
+          </p:cNvPr>
+          <p:cNvSpPr/>
+          <p:nvPr/>
+        </p:nvSpPr>
+        <p:spPr>
+          <a:xfrm>
+            <a:off x="6589067" y="1703912"/>
+            <a:ext cx="796705" cy="398352"/>
+          </a:xfrm>
+          <a:prstGeom prst="snip2SameRect">
+            <a:avLst/>
+          </a:prstGeom>
+        </p:spPr>
+        <p:style>
+          <a:lnRef idx="2">
+            <a:schemeClr val="accent4">
+              <a:shade val="50000"/>
+            </a:schemeClr>
+          </a:lnRef>
+          <a:fillRef idx="1">
+            <a:schemeClr val="accent4"/>
+          </a:fillRef>
+          <a:effectRef idx="0">
+            <a:schemeClr val="accent4"/>
+          </a:effectRef>
+          <a:fontRef idx="minor">
+            <a:schemeClr val="lt1"/>
+          </a:fontRef>
+        </p:style>
+        <p:txBody>
+          <a:bodyPr rtlCol="0" anchor="ctr"/>
+          <a:lstStyle/>
+          <a:p>
+            <a:pPr algn="ctr"/>
+            <a:endParaRPr lang="ko-KR" altLang="en-US"/>
+          </a:p>
+        </p:txBody>
+      </p:sp>
+      <p:sp>
+        <p:nvSpPr>
+          <p:cNvPr id="15" name="직사각형 14">
+            <a:extLst>
+              <a:ext uri="{FF2B5EF4-FFF2-40B4-BE49-F238E27FC236}">
+                <a16:creationId xmlns:a16="http://schemas.microsoft.com/office/drawing/2014/main" id="{3F190DF3-F919-4BC9-9E71-9847961864F4}"/>
+              </a:ext>
+            </a:extLst>
+          </p:cNvPr>
+          <p:cNvSpPr/>
+          <p:nvPr/>
+        </p:nvSpPr>
+        <p:spPr>
+          <a:xfrm>
+            <a:off x="1104523" y="1241255"/>
+            <a:ext cx="633742" cy="457200"/>
+          </a:xfrm>
+          <a:prstGeom prst="rect">
+            <a:avLst/>
+          </a:prstGeom>
+        </p:spPr>
+        <p:style>
+          <a:lnRef idx="2">
+            <a:schemeClr val="accent1">
+              <a:shade val="50000"/>
+            </a:schemeClr>
+          </a:lnRef>
+          <a:fillRef idx="1">
+            <a:schemeClr val="accent1"/>
+          </a:fillRef>
+          <a:effectRef idx="0">
+            <a:schemeClr val="accent1"/>
+          </a:effectRef>
+          <a:fontRef idx="minor">
+            <a:schemeClr val="lt1"/>
+          </a:fontRef>
+        </p:style>
+        <p:txBody>
+          <a:bodyPr rtlCol="0" anchor="ctr"/>
+          <a:lstStyle/>
+          <a:p>
+            <a:pPr algn="ctr"/>
+            <a:endParaRPr lang="ko-KR" altLang="en-US"/>
+          </a:p>
+        </p:txBody>
+      </p:sp>
+      <p:sp>
+        <p:nvSpPr>
+          <p:cNvPr id="16" name="TextBox 15">
+            <a:extLst>
+              <a:ext uri="{FF2B5EF4-FFF2-40B4-BE49-F238E27FC236}">
+                <a16:creationId xmlns:a16="http://schemas.microsoft.com/office/drawing/2014/main" id="{E039BD42-735B-47EE-BBE4-8579B7615B91}"/>
+              </a:ext>
+            </a:extLst>
+          </p:cNvPr>
+          <p:cNvSpPr txBox="1"/>
+          <p:nvPr/>
+        </p:nvSpPr>
+        <p:spPr>
+          <a:xfrm>
+            <a:off x="548870" y="853816"/>
+            <a:ext cx="1871025" cy="369332"/>
+          </a:xfrm>
+          <a:prstGeom prst="rect">
+            <a:avLst/>
+          </a:prstGeom>
+          <a:noFill/>
+        </p:spPr>
+        <p:txBody>
+          <a:bodyPr wrap="none" rtlCol="0">
+            <a:spAutoFit/>
+          </a:bodyPr>
+          <a:lstStyle/>
+          <a:p>
+            <a:r>
+              <a:rPr lang="en-US" altLang="ko-KR" b="1" dirty="0">
+                <a:latin typeface="Times New Roman" panose="02020603050405020304" pitchFamily="18" charset="0"/>
+                <a:cs typeface="Times New Roman" panose="02020603050405020304" pitchFamily="18" charset="0"/>
+              </a:rPr>
+              <a:t>Detection anchor</a:t>
+            </a:r>
+            <a:endParaRPr lang="ko-KR" altLang="en-US" b="1" dirty="0">
+              <a:latin typeface="Times New Roman" panose="02020603050405020304" pitchFamily="18" charset="0"/>
+              <a:cs typeface="Times New Roman" panose="02020603050405020304" pitchFamily="18" charset="0"/>
+            </a:endParaRPr>
+          </a:p>
+        </p:txBody>
+      </p:sp>
+      <p:sp>
+        <p:nvSpPr>
+          <p:cNvPr id="17" name="직사각형 16">
+            <a:extLst>
+              <a:ext uri="{FF2B5EF4-FFF2-40B4-BE49-F238E27FC236}">
+                <a16:creationId xmlns:a16="http://schemas.microsoft.com/office/drawing/2014/main" id="{B4C0B892-EDEB-45D0-B38D-DC357BC39D74}"/>
+              </a:ext>
+            </a:extLst>
+          </p:cNvPr>
+          <p:cNvSpPr/>
+          <p:nvPr/>
+        </p:nvSpPr>
+        <p:spPr>
+          <a:xfrm>
+            <a:off x="4682973" y="2254313"/>
+            <a:ext cx="458022" cy="380710"/>
+          </a:xfrm>
+          <a:prstGeom prst="rect">
+            <a:avLst/>
+          </a:prstGeom>
+        </p:spPr>
+        <p:style>
+          <a:lnRef idx="2">
+            <a:schemeClr val="accent1">
+              <a:shade val="50000"/>
+            </a:schemeClr>
+          </a:lnRef>
+          <a:fillRef idx="1">
+            <a:schemeClr val="accent1"/>
+          </a:fillRef>
+          <a:effectRef idx="0">
+            <a:schemeClr val="accent1"/>
+          </a:effectRef>
+          <a:fontRef idx="minor">
+            <a:schemeClr val="lt1"/>
+          </a:fontRef>
+        </p:style>
+        <p:txBody>
+          <a:bodyPr rtlCol="0" anchor="ctr"/>
+          <a:lstStyle/>
+          <a:p>
+            <a:pPr algn="ctr"/>
+            <a:endParaRPr lang="ko-KR" altLang="en-US"/>
+          </a:p>
+        </p:txBody>
+      </p:sp>
+      <p:sp>
+        <p:nvSpPr>
+          <p:cNvPr id="18" name="TextBox 17">
+            <a:extLst>
+              <a:ext uri="{FF2B5EF4-FFF2-40B4-BE49-F238E27FC236}">
+                <a16:creationId xmlns:a16="http://schemas.microsoft.com/office/drawing/2014/main" id="{4A11B776-1C1F-4AE3-8422-85A521787677}"/>
+              </a:ext>
+            </a:extLst>
+          </p:cNvPr>
+          <p:cNvSpPr txBox="1"/>
+          <p:nvPr/>
+        </p:nvSpPr>
+        <p:spPr>
+          <a:xfrm>
+            <a:off x="1273169" y="2968730"/>
+            <a:ext cx="2089033" cy="369332"/>
+          </a:xfrm>
+          <a:prstGeom prst="rect">
+            <a:avLst/>
+          </a:prstGeom>
+          <a:noFill/>
+        </p:spPr>
+        <p:txBody>
+          <a:bodyPr wrap="none" rtlCol="0">
+            <a:spAutoFit/>
+          </a:bodyPr>
+          <a:lstStyle/>
+          <a:p>
+            <a:r>
+              <a:rPr lang="ko-KR" altLang="en-US" b="1" dirty="0">
+                <a:latin typeface="Times New Roman" panose="02020603050405020304" pitchFamily="18" charset="0"/>
+                <a:cs typeface="Times New Roman" panose="02020603050405020304" pitchFamily="18" charset="0"/>
+              </a:rPr>
+              <a:t>색종이가 보여야함</a:t>
+            </a:r>
+          </a:p>
+        </p:txBody>
+      </p:sp>
+      <p:sp>
+        <p:nvSpPr>
+          <p:cNvPr id="19" name="직사각형 18">
+            <a:extLst>
+              <a:ext uri="{FF2B5EF4-FFF2-40B4-BE49-F238E27FC236}">
+                <a16:creationId xmlns:a16="http://schemas.microsoft.com/office/drawing/2014/main" id="{7C533600-8EE9-481E-9582-25E45D6FBDCA}"/>
+              </a:ext>
+            </a:extLst>
+          </p:cNvPr>
+          <p:cNvSpPr/>
+          <p:nvPr/>
+        </p:nvSpPr>
+        <p:spPr>
+          <a:xfrm>
+            <a:off x="697117" y="4138364"/>
+            <a:ext cx="11067860" cy="2209046"/>
+          </a:xfrm>
+          <a:prstGeom prst="rect">
+            <a:avLst/>
+          </a:prstGeom>
+          <a:noFill/>
+          <a:ln>
+            <a:solidFill>
+              <a:schemeClr val="tx1"/>
+            </a:solidFill>
+          </a:ln>
+        </p:spPr>
+        <p:style>
+          <a:lnRef idx="2">
+            <a:schemeClr val="accent1">
+              <a:shade val="50000"/>
+            </a:schemeClr>
+          </a:lnRef>
+          <a:fillRef idx="1">
+            <a:schemeClr val="accent1"/>
+          </a:fillRef>
+          <a:effectRef idx="0">
+            <a:schemeClr val="accent1"/>
+          </a:effectRef>
+          <a:fontRef idx="minor">
+            <a:schemeClr val="lt1"/>
+          </a:fontRef>
+        </p:style>
+        <p:txBody>
+          <a:bodyPr rtlCol="0" anchor="ctr"/>
+          <a:lstStyle/>
+          <a:p>
+            <a:pPr algn="ctr"/>
+            <a:endParaRPr lang="ko-KR" altLang="en-US"/>
+          </a:p>
+        </p:txBody>
+      </p:sp>
+      <p:sp>
+        <p:nvSpPr>
+          <p:cNvPr id="20" name="TextBox 19">
+            <a:extLst>
+              <a:ext uri="{FF2B5EF4-FFF2-40B4-BE49-F238E27FC236}">
+                <a16:creationId xmlns:a16="http://schemas.microsoft.com/office/drawing/2014/main" id="{61243281-E440-42B2-BF70-8B270EBAF52D}"/>
+              </a:ext>
+            </a:extLst>
+          </p:cNvPr>
+          <p:cNvSpPr txBox="1"/>
+          <p:nvPr/>
+        </p:nvSpPr>
+        <p:spPr>
+          <a:xfrm>
+            <a:off x="1052520" y="4267903"/>
+            <a:ext cx="4743606" cy="369332"/>
+          </a:xfrm>
+          <a:prstGeom prst="rect">
+            <a:avLst/>
+          </a:prstGeom>
+          <a:noFill/>
+        </p:spPr>
+        <p:txBody>
+          <a:bodyPr wrap="none" rtlCol="0">
+            <a:spAutoFit/>
+          </a:bodyPr>
+          <a:lstStyle/>
+          <a:p>
+            <a:r>
+              <a:rPr lang="ko-KR" altLang="en-US" b="1" dirty="0">
+                <a:latin typeface="Times New Roman" panose="02020603050405020304" pitchFamily="18" charset="0"/>
+                <a:cs typeface="Times New Roman" panose="02020603050405020304" pitchFamily="18" charset="0"/>
+              </a:rPr>
+              <a:t>한 화면에 저 위치 그대로 구현되어 있으면 됨</a:t>
+            </a:r>
+          </a:p>
+        </p:txBody>
+      </p:sp>
+      <p:sp>
+        <p:nvSpPr>
+          <p:cNvPr id="21" name="TextBox 20">
+            <a:extLst>
+              <a:ext uri="{FF2B5EF4-FFF2-40B4-BE49-F238E27FC236}">
+                <a16:creationId xmlns:a16="http://schemas.microsoft.com/office/drawing/2014/main" id="{386095D5-8C55-4547-A2DC-C382645C0E8B}"/>
+              </a:ext>
+            </a:extLst>
+          </p:cNvPr>
+          <p:cNvSpPr txBox="1"/>
+          <p:nvPr/>
+        </p:nvSpPr>
+        <p:spPr>
+          <a:xfrm>
+            <a:off x="6589067" y="3130825"/>
+            <a:ext cx="5182829" cy="923330"/>
+          </a:xfrm>
+          <a:prstGeom prst="rect">
+            <a:avLst/>
+          </a:prstGeom>
+          <a:noFill/>
+        </p:spPr>
+        <p:txBody>
+          <a:bodyPr wrap="none" rtlCol="0">
+            <a:spAutoFit/>
+          </a:bodyPr>
+          <a:lstStyle/>
+          <a:p>
+            <a:r>
+              <a:rPr lang="en-US" altLang="ko-KR" b="1" dirty="0">
+                <a:latin typeface="Times New Roman" panose="02020603050405020304" pitchFamily="18" charset="0"/>
+                <a:cs typeface="Times New Roman" panose="02020603050405020304" pitchFamily="18" charset="0"/>
+              </a:rPr>
+              <a:t>+ </a:t>
+            </a:r>
+            <a:r>
+              <a:rPr lang="ko-KR" altLang="en-US" b="1" dirty="0">
+                <a:latin typeface="Times New Roman" panose="02020603050405020304" pitchFamily="18" charset="0"/>
+                <a:cs typeface="Times New Roman" panose="02020603050405020304" pitchFamily="18" charset="0"/>
+              </a:rPr>
+              <a:t>저번에 이종민 선임한테 보냈던 </a:t>
+            </a:r>
+            <a:r>
+              <a:rPr lang="en-US" altLang="ko-KR" b="1" dirty="0">
+                <a:latin typeface="Times New Roman" panose="02020603050405020304" pitchFamily="18" charset="0"/>
+                <a:cs typeface="Times New Roman" panose="02020603050405020304" pitchFamily="18" charset="0"/>
+              </a:rPr>
+              <a:t>10</a:t>
+            </a:r>
+            <a:r>
+              <a:rPr lang="ko-KR" altLang="en-US" b="1" dirty="0" err="1">
+                <a:latin typeface="Times New Roman" panose="02020603050405020304" pitchFamily="18" charset="0"/>
+                <a:cs typeface="Times New Roman" panose="02020603050405020304" pitchFamily="18" charset="0"/>
+              </a:rPr>
+              <a:t>분짜리</a:t>
+            </a:r>
+            <a:r>
+              <a:rPr lang="ko-KR" altLang="en-US" b="1" dirty="0">
+                <a:latin typeface="Times New Roman" panose="02020603050405020304" pitchFamily="18" charset="0"/>
+                <a:cs typeface="Times New Roman" panose="02020603050405020304" pitchFamily="18" charset="0"/>
+              </a:rPr>
+              <a:t> </a:t>
+            </a:r>
+            <a:r>
+              <a:rPr lang="en-US" altLang="ko-KR" b="1" dirty="0">
+                <a:latin typeface="Times New Roman" panose="02020603050405020304" pitchFamily="18" charset="0"/>
+                <a:cs typeface="Times New Roman" panose="02020603050405020304" pitchFamily="18" charset="0"/>
+              </a:rPr>
+              <a:t>csv </a:t>
+            </a:r>
+            <a:r>
+              <a:rPr lang="ko-KR" altLang="en-US" b="1" dirty="0">
+                <a:latin typeface="Times New Roman" panose="02020603050405020304" pitchFamily="18" charset="0"/>
+                <a:cs typeface="Times New Roman" panose="02020603050405020304" pitchFamily="18" charset="0"/>
+              </a:rPr>
+              <a:t>값</a:t>
+            </a:r>
+            <a:endParaRPr lang="en-US" altLang="ko-KR" b="1" dirty="0">
+              <a:latin typeface="Times New Roman" panose="02020603050405020304" pitchFamily="18" charset="0"/>
+              <a:cs typeface="Times New Roman" panose="02020603050405020304" pitchFamily="18" charset="0"/>
+            </a:endParaRPr>
+          </a:p>
+          <a:p>
+            <a:r>
+              <a:rPr lang="ko-KR" altLang="en-US" b="1" dirty="0">
+                <a:latin typeface="Times New Roman" panose="02020603050405020304" pitchFamily="18" charset="0"/>
+                <a:cs typeface="Times New Roman" panose="02020603050405020304" pitchFamily="18" charset="0"/>
+              </a:rPr>
+              <a:t>다 </a:t>
+            </a:r>
+            <a:r>
+              <a:rPr lang="en-US" altLang="ko-KR" b="1" dirty="0">
+                <a:latin typeface="Times New Roman" panose="02020603050405020304" pitchFamily="18" charset="0"/>
+                <a:cs typeface="Times New Roman" panose="02020603050405020304" pitchFamily="18" charset="0"/>
+              </a:rPr>
+              <a:t>24</a:t>
+            </a:r>
+            <a:r>
+              <a:rPr lang="ko-KR" altLang="en-US" b="1" dirty="0">
+                <a:latin typeface="Times New Roman" panose="02020603050405020304" pitchFamily="18" charset="0"/>
+                <a:cs typeface="Times New Roman" panose="02020603050405020304" pitchFamily="18" charset="0"/>
+              </a:rPr>
+              <a:t>시간으로 곱하기 </a:t>
+            </a:r>
+            <a:r>
+              <a:rPr lang="en-US" altLang="ko-KR" b="1" dirty="0">
+                <a:latin typeface="Times New Roman" panose="02020603050405020304" pitchFamily="18" charset="0"/>
+                <a:cs typeface="Times New Roman" panose="02020603050405020304" pitchFamily="18" charset="0"/>
+              </a:rPr>
+              <a:t>10</a:t>
+            </a:r>
+            <a:r>
+              <a:rPr lang="ko-KR" altLang="en-US" b="1" dirty="0">
+                <a:latin typeface="Times New Roman" panose="02020603050405020304" pitchFamily="18" charset="0"/>
+                <a:cs typeface="Times New Roman" panose="02020603050405020304" pitchFamily="18" charset="0"/>
+              </a:rPr>
+              <a:t>분 </a:t>
+            </a:r>
+            <a:r>
+              <a:rPr lang="en-US" altLang="ko-KR" b="1" dirty="0">
+                <a:latin typeface="Times New Roman" panose="02020603050405020304" pitchFamily="18" charset="0"/>
+                <a:cs typeface="Times New Roman" panose="02020603050405020304" pitchFamily="18" charset="0"/>
+              </a:rPr>
+              <a:t>* 6 * 24</a:t>
+            </a:r>
+          </a:p>
+          <a:p>
+            <a:r>
+              <a:rPr lang="ko-KR" altLang="en-US" b="1" dirty="0">
+                <a:latin typeface="Times New Roman" panose="02020603050405020304" pitchFamily="18" charset="0"/>
+                <a:cs typeface="Times New Roman" panose="02020603050405020304" pitchFamily="18" charset="0"/>
+              </a:rPr>
+              <a:t>로 변경된 엑셀파일 있어야함</a:t>
+            </a:r>
+          </a:p>
+        </p:txBody>
+      </p:sp>
+    </p:spTree>
+    <p:extLst>
+      <p:ext uri="{BB962C8B-B14F-4D97-AF65-F5344CB8AC3E}">
+        <p14:creationId xmlns:p14="http://schemas.microsoft.com/office/powerpoint/2010/main" val="3114002639"/>
       </p:ext>
     </p:extLst>
   </p:cSld>

</xml_diff>